<commit_message>
präsi saras kommentar hinzugefügt
</commit_message>
<xml_diff>
--- a/Dokumente/kpmi_gr2_end.pptx
+++ b/Dokumente/kpmi_gr2_end.pptx
@@ -2749,21 +2749,21 @@
     </dgm:pt>
   </dgm:ptLst>
   <dgm:cxnLst>
+    <dgm:cxn modelId="{1B0287E1-F131-4D48-874C-226B1B0D227B}" type="presOf" srcId="{637EDB6E-0644-49A6-BCCD-613D803A24B7}" destId="{648FDD53-AF76-4DCB-8DC3-6F24E10A06E3}" srcOrd="0" destOrd="0" presId="urn:microsoft.com/office/officeart/2005/8/layout/vList2"/>
+    <dgm:cxn modelId="{C79EF2D5-63BD-4A06-9A26-82B6EF9DBB67}" srcId="{4332AC89-A1BD-459D-87C2-6F479FC10CC2}" destId="{93DAA940-EAC0-4032-91B0-E28D5C25790D}" srcOrd="0" destOrd="0" parTransId="{CFE4E8F4-0965-49BD-84EE-60B61C3789D7}" sibTransId="{75D887DF-B2A9-44FA-9FC5-EF7054CEB602}"/>
+    <dgm:cxn modelId="{3D3E7F3B-8BB3-449E-AA9C-FDE6EC5F79D3}" type="presOf" srcId="{4332AC89-A1BD-459D-87C2-6F479FC10CC2}" destId="{7324F923-0CB8-4701-943F-E803D4D6DFB2}" srcOrd="0" destOrd="0" presId="urn:microsoft.com/office/officeart/2005/8/layout/vList2"/>
+    <dgm:cxn modelId="{11D72B30-347D-4727-92CC-E792B3FEA65D}" type="presOf" srcId="{850CD563-4507-4652-B7BB-C2ED3A4C2C78}" destId="{FDAAD52F-DFBD-4D16-B914-28271FA6D135}" srcOrd="0" destOrd="0" presId="urn:microsoft.com/office/officeart/2005/8/layout/vList2"/>
+    <dgm:cxn modelId="{CA4DC766-131F-496A-9AB3-9D2B1B20598D}" srcId="{637EDB6E-0644-49A6-BCCD-613D803A24B7}" destId="{CA0F43C4-2DEA-4AD0-8673-A9868637C8EB}" srcOrd="1" destOrd="0" parTransId="{E2AFCB86-D3ED-4483-92B7-6A37DE43E333}" sibTransId="{46F331CD-5F1A-44B2-A7A4-39E3276AA387}"/>
+    <dgm:cxn modelId="{9C14F783-BDE2-4FD2-AB02-BD66E049D738}" type="presOf" srcId="{93DAA940-EAC0-4032-91B0-E28D5C25790D}" destId="{A9A78446-8152-4511-B706-4F1697FA6F97}" srcOrd="0" destOrd="0" presId="urn:microsoft.com/office/officeart/2005/8/layout/vList2"/>
     <dgm:cxn modelId="{3DA62923-F8E9-4C43-A26D-F2872166F74C}" srcId="{E2D89148-3BC5-430F-B29E-1E3355B61F47}" destId="{14A60841-FD98-4963-9F9B-D4A1EF360BD7}" srcOrd="0" destOrd="0" parTransId="{7C6C958E-E5CB-46DB-8394-48FD49DE6A3E}" sibTransId="{B5D00AF8-8E72-4230-AFBD-2F5B59E3F46B}"/>
-    <dgm:cxn modelId="{1B0287E1-F131-4D48-874C-226B1B0D227B}" type="presOf" srcId="{637EDB6E-0644-49A6-BCCD-613D803A24B7}" destId="{648FDD53-AF76-4DCB-8DC3-6F24E10A06E3}" srcOrd="0" destOrd="0" presId="urn:microsoft.com/office/officeart/2005/8/layout/vList2"/>
+    <dgm:cxn modelId="{00FE9057-7764-4315-A412-1316C110C914}" srcId="{637EDB6E-0644-49A6-BCCD-613D803A24B7}" destId="{E2D89148-3BC5-430F-B29E-1E3355B61F47}" srcOrd="2" destOrd="0" parTransId="{78A8AD71-1ADB-4CE3-B4BD-3CBC79A492D1}" sibTransId="{2B79EF93-F91C-4CCC-8665-F6A043198030}"/>
+    <dgm:cxn modelId="{79D78EAF-AE5C-4F0B-A9C4-480D8DBF0E80}" srcId="{637EDB6E-0644-49A6-BCCD-613D803A24B7}" destId="{4332AC89-A1BD-459D-87C2-6F479FC10CC2}" srcOrd="0" destOrd="0" parTransId="{E08F6A81-D0C9-4536-9A07-CE3E020E80C9}" sibTransId="{8A1478E7-3194-4613-8E1D-D98F763CC4AA}"/>
+    <dgm:cxn modelId="{CC5D2E3A-FDC6-4D8C-8171-4EC28DCCA485}" type="presOf" srcId="{14A60841-FD98-4963-9F9B-D4A1EF360BD7}" destId="{4764C841-0A22-4DEB-BA1C-4292D23E9765}" srcOrd="0" destOrd="0" presId="urn:microsoft.com/office/officeart/2005/8/layout/vList2"/>
+    <dgm:cxn modelId="{DD5C3EDD-EC68-4064-86C9-988E431D0D5F}" type="presOf" srcId="{CA0F43C4-2DEA-4AD0-8673-A9868637C8EB}" destId="{6FC9298D-2CC7-4AAB-B512-0C20F9EAF86F}" srcOrd="0" destOrd="0" presId="urn:microsoft.com/office/officeart/2005/8/layout/vList2"/>
+    <dgm:cxn modelId="{1F89B46F-F3FF-4ADC-A00D-11904BF40484}" type="presOf" srcId="{E2D89148-3BC5-430F-B29E-1E3355B61F47}" destId="{916727EE-B735-472A-A135-0E7AE438E74E}" srcOrd="0" destOrd="0" presId="urn:microsoft.com/office/officeart/2005/8/layout/vList2"/>
+    <dgm:cxn modelId="{6A4D3E88-DC61-407B-AAC3-FF0DA85631BE}" type="presOf" srcId="{4F82774A-107F-4DA0-9A06-D51A5EA8E791}" destId="{39503DF7-D5E4-4C49-BB79-2EAC1C671572}" srcOrd="0" destOrd="0" presId="urn:microsoft.com/office/officeart/2005/8/layout/vList2"/>
+    <dgm:cxn modelId="{8179B5D2-0FDD-4387-A539-EC25758FFE6F}" srcId="{850CD563-4507-4652-B7BB-C2ED3A4C2C78}" destId="{4F82774A-107F-4DA0-9A06-D51A5EA8E791}" srcOrd="0" destOrd="0" parTransId="{9BC25322-20EA-4784-81C8-F754DDC85F75}" sibTransId="{5D425376-3622-4E2F-8CEC-7BC0F80FF005}"/>
     <dgm:cxn modelId="{9F4F3B05-16CE-4107-9A32-1B523B913314}" srcId="{637EDB6E-0644-49A6-BCCD-613D803A24B7}" destId="{850CD563-4507-4652-B7BB-C2ED3A4C2C78}" srcOrd="3" destOrd="0" parTransId="{18C8BA72-932D-43C5-B1EE-6E0ED57B3526}" sibTransId="{DE73E0C1-1256-4068-97E7-FF0DB31922EE}"/>
-    <dgm:cxn modelId="{1F89B46F-F3FF-4ADC-A00D-11904BF40484}" type="presOf" srcId="{E2D89148-3BC5-430F-B29E-1E3355B61F47}" destId="{916727EE-B735-472A-A135-0E7AE438E74E}" srcOrd="0" destOrd="0" presId="urn:microsoft.com/office/officeart/2005/8/layout/vList2"/>
-    <dgm:cxn modelId="{C79EF2D5-63BD-4A06-9A26-82B6EF9DBB67}" srcId="{4332AC89-A1BD-459D-87C2-6F479FC10CC2}" destId="{93DAA940-EAC0-4032-91B0-E28D5C25790D}" srcOrd="0" destOrd="0" parTransId="{CFE4E8F4-0965-49BD-84EE-60B61C3789D7}" sibTransId="{75D887DF-B2A9-44FA-9FC5-EF7054CEB602}"/>
-    <dgm:cxn modelId="{9C14F783-BDE2-4FD2-AB02-BD66E049D738}" type="presOf" srcId="{93DAA940-EAC0-4032-91B0-E28D5C25790D}" destId="{A9A78446-8152-4511-B706-4F1697FA6F97}" srcOrd="0" destOrd="0" presId="urn:microsoft.com/office/officeart/2005/8/layout/vList2"/>
-    <dgm:cxn modelId="{DD5C3EDD-EC68-4064-86C9-988E431D0D5F}" type="presOf" srcId="{CA0F43C4-2DEA-4AD0-8673-A9868637C8EB}" destId="{6FC9298D-2CC7-4AAB-B512-0C20F9EAF86F}" srcOrd="0" destOrd="0" presId="urn:microsoft.com/office/officeart/2005/8/layout/vList2"/>
-    <dgm:cxn modelId="{CA4DC766-131F-496A-9AB3-9D2B1B20598D}" srcId="{637EDB6E-0644-49A6-BCCD-613D803A24B7}" destId="{CA0F43C4-2DEA-4AD0-8673-A9868637C8EB}" srcOrd="1" destOrd="0" parTransId="{E2AFCB86-D3ED-4483-92B7-6A37DE43E333}" sibTransId="{46F331CD-5F1A-44B2-A7A4-39E3276AA387}"/>
-    <dgm:cxn modelId="{8179B5D2-0FDD-4387-A539-EC25758FFE6F}" srcId="{850CD563-4507-4652-B7BB-C2ED3A4C2C78}" destId="{4F82774A-107F-4DA0-9A06-D51A5EA8E791}" srcOrd="0" destOrd="0" parTransId="{9BC25322-20EA-4784-81C8-F754DDC85F75}" sibTransId="{5D425376-3622-4E2F-8CEC-7BC0F80FF005}"/>
-    <dgm:cxn modelId="{6A4D3E88-DC61-407B-AAC3-FF0DA85631BE}" type="presOf" srcId="{4F82774A-107F-4DA0-9A06-D51A5EA8E791}" destId="{39503DF7-D5E4-4C49-BB79-2EAC1C671572}" srcOrd="0" destOrd="0" presId="urn:microsoft.com/office/officeart/2005/8/layout/vList2"/>
-    <dgm:cxn modelId="{3D3E7F3B-8BB3-449E-AA9C-FDE6EC5F79D3}" type="presOf" srcId="{4332AC89-A1BD-459D-87C2-6F479FC10CC2}" destId="{7324F923-0CB8-4701-943F-E803D4D6DFB2}" srcOrd="0" destOrd="0" presId="urn:microsoft.com/office/officeart/2005/8/layout/vList2"/>
-    <dgm:cxn modelId="{CC5D2E3A-FDC6-4D8C-8171-4EC28DCCA485}" type="presOf" srcId="{14A60841-FD98-4963-9F9B-D4A1EF360BD7}" destId="{4764C841-0A22-4DEB-BA1C-4292D23E9765}" srcOrd="0" destOrd="0" presId="urn:microsoft.com/office/officeart/2005/8/layout/vList2"/>
-    <dgm:cxn modelId="{79D78EAF-AE5C-4F0B-A9C4-480D8DBF0E80}" srcId="{637EDB6E-0644-49A6-BCCD-613D803A24B7}" destId="{4332AC89-A1BD-459D-87C2-6F479FC10CC2}" srcOrd="0" destOrd="0" parTransId="{E08F6A81-D0C9-4536-9A07-CE3E020E80C9}" sibTransId="{8A1478E7-3194-4613-8E1D-D98F763CC4AA}"/>
-    <dgm:cxn modelId="{00FE9057-7764-4315-A412-1316C110C914}" srcId="{637EDB6E-0644-49A6-BCCD-613D803A24B7}" destId="{E2D89148-3BC5-430F-B29E-1E3355B61F47}" srcOrd="2" destOrd="0" parTransId="{78A8AD71-1ADB-4CE3-B4BD-3CBC79A492D1}" sibTransId="{2B79EF93-F91C-4CCC-8665-F6A043198030}"/>
-    <dgm:cxn modelId="{11D72B30-347D-4727-92CC-E792B3FEA65D}" type="presOf" srcId="{850CD563-4507-4652-B7BB-C2ED3A4C2C78}" destId="{FDAAD52F-DFBD-4D16-B914-28271FA6D135}" srcOrd="0" destOrd="0" presId="urn:microsoft.com/office/officeart/2005/8/layout/vList2"/>
     <dgm:cxn modelId="{2ACD2013-6864-4649-9D6A-C2D9A2531C09}" type="presParOf" srcId="{648FDD53-AF76-4DCB-8DC3-6F24E10A06E3}" destId="{7324F923-0CB8-4701-943F-E803D4D6DFB2}" srcOrd="0" destOrd="0" presId="urn:microsoft.com/office/officeart/2005/8/layout/vList2"/>
     <dgm:cxn modelId="{CF0F6E1C-69A3-4D8A-A337-FC47A3ED33B0}" type="presParOf" srcId="{648FDD53-AF76-4DCB-8DC3-6F24E10A06E3}" destId="{A9A78446-8152-4511-B706-4F1697FA6F97}" srcOrd="1" destOrd="0" presId="urn:microsoft.com/office/officeart/2005/8/layout/vList2"/>
     <dgm:cxn modelId="{7C608915-C6D2-468F-8241-1ABA705BAD56}" type="presParOf" srcId="{648FDD53-AF76-4DCB-8DC3-6F24E10A06E3}" destId="{6FC9298D-2CC7-4AAB-B512-0C20F9EAF86F}" srcOrd="2" destOrd="0" presId="urn:microsoft.com/office/officeart/2005/8/layout/vList2"/>
@@ -2873,6 +2873,86 @@
         </a:p>
       </dgm:t>
     </dgm:pt>
+    <dgm:pt modelId="{48A04D13-92A0-4866-976A-E14717149447}">
+      <dgm:prSet/>
+      <dgm:spPr/>
+      <dgm:t>
+        <a:bodyPr/>
+        <a:lstStyle/>
+        <a:p>
+          <a:pPr rtl="0"/>
+          <a:r>
+            <a:rPr lang="de-DE" dirty="0" err="1" smtClean="0"/>
+            <a:t>Balancing</a:t>
+          </a:r>
+          <a:endParaRPr lang="de-DE" dirty="0"/>
+        </a:p>
+      </dgm:t>
+    </dgm:pt>
+    <dgm:pt modelId="{CC338EC9-8727-4AFD-BA29-D73D370A8E84}" type="parTrans" cxnId="{18DFD051-FCA7-4EBF-A032-31987FE2CAE2}">
+      <dgm:prSet/>
+      <dgm:spPr/>
+      <dgm:t>
+        <a:bodyPr/>
+        <a:lstStyle/>
+        <a:p>
+          <a:endParaRPr lang="de-DE"/>
+        </a:p>
+      </dgm:t>
+    </dgm:pt>
+    <dgm:pt modelId="{8EAB64D1-E0A9-4455-B8C9-B78E215C21B9}" type="sibTrans" cxnId="{18DFD051-FCA7-4EBF-A032-31987FE2CAE2}">
+      <dgm:prSet/>
+      <dgm:spPr/>
+      <dgm:t>
+        <a:bodyPr/>
+        <a:lstStyle/>
+        <a:p>
+          <a:endParaRPr lang="de-DE"/>
+        </a:p>
+      </dgm:t>
+    </dgm:pt>
+    <dgm:pt modelId="{CF58630A-696F-463E-A327-A6769B809D05}">
+      <dgm:prSet/>
+      <dgm:spPr/>
+      <dgm:t>
+        <a:bodyPr/>
+        <a:lstStyle/>
+        <a:p>
+          <a:pPr rtl="0"/>
+          <a:r>
+            <a:rPr lang="de-DE" dirty="0" err="1" smtClean="0"/>
+            <a:t>Balancing</a:t>
+          </a:r>
+          <a:r>
+            <a:rPr lang="de-DE" dirty="0" smtClean="0"/>
+            <a:t> zwischen Spieler und Monstern wurde optimiert</a:t>
+          </a:r>
+          <a:endParaRPr lang="de-DE" dirty="0"/>
+        </a:p>
+      </dgm:t>
+    </dgm:pt>
+    <dgm:pt modelId="{B0E917E1-06B7-4E6F-99F3-08F4E4F99A34}" type="parTrans" cxnId="{AE5089A9-19A5-40EE-95A3-F538D754775B}">
+      <dgm:prSet/>
+      <dgm:spPr/>
+      <dgm:t>
+        <a:bodyPr/>
+        <a:lstStyle/>
+        <a:p>
+          <a:endParaRPr lang="de-DE"/>
+        </a:p>
+      </dgm:t>
+    </dgm:pt>
+    <dgm:pt modelId="{86D204B1-87A6-4D1C-9947-43FBABFD0865}" type="sibTrans" cxnId="{AE5089A9-19A5-40EE-95A3-F538D754775B}">
+      <dgm:prSet/>
+      <dgm:spPr/>
+      <dgm:t>
+        <a:bodyPr/>
+        <a:lstStyle/>
+        <a:p>
+          <a:endParaRPr lang="de-DE"/>
+        </a:p>
+      </dgm:t>
+    </dgm:pt>
     <dgm:pt modelId="{B04E331D-BAFE-426D-B084-CFB8553E2B09}" type="pres">
       <dgm:prSet presAssocID="{9791EE8E-6130-4D6C-B203-8E3C213DCBD4}" presName="linear" presStyleCnt="0">
         <dgm:presLayoutVars>
@@ -2890,7 +2970,7 @@
       </dgm:t>
     </dgm:pt>
     <dgm:pt modelId="{2D61DBCF-6287-44DA-A275-8F5D8F9FA325}" type="pres">
-      <dgm:prSet presAssocID="{99A1590F-8B63-43D5-88BE-F2C6CE48541B}" presName="parentText" presStyleLbl="node1" presStyleIdx="0" presStyleCnt="1">
+      <dgm:prSet presAssocID="{99A1590F-8B63-43D5-88BE-F2C6CE48541B}" presName="parentText" presStyleLbl="node1" presStyleIdx="0" presStyleCnt="2">
         <dgm:presLayoutVars>
           <dgm:chMax val="0"/>
           <dgm:bulletEnabled val="1"/>
@@ -2906,7 +2986,38 @@
       </dgm:t>
     </dgm:pt>
     <dgm:pt modelId="{CBA7FB57-29F7-4941-9259-633B0B64FD75}" type="pres">
-      <dgm:prSet presAssocID="{99A1590F-8B63-43D5-88BE-F2C6CE48541B}" presName="childText" presStyleLbl="revTx" presStyleIdx="0" presStyleCnt="1">
+      <dgm:prSet presAssocID="{99A1590F-8B63-43D5-88BE-F2C6CE48541B}" presName="childText" presStyleLbl="revTx" presStyleIdx="0" presStyleCnt="2">
+        <dgm:presLayoutVars>
+          <dgm:bulletEnabled val="1"/>
+        </dgm:presLayoutVars>
+      </dgm:prSet>
+      <dgm:spPr/>
+      <dgm:t>
+        <a:bodyPr/>
+        <a:lstStyle/>
+        <a:p>
+          <a:endParaRPr lang="de-DE"/>
+        </a:p>
+      </dgm:t>
+    </dgm:pt>
+    <dgm:pt modelId="{C9EDDB65-5233-40CD-A818-7518C4EA98F5}" type="pres">
+      <dgm:prSet presAssocID="{48A04D13-92A0-4866-976A-E14717149447}" presName="parentText" presStyleLbl="node1" presStyleIdx="1" presStyleCnt="2">
+        <dgm:presLayoutVars>
+          <dgm:chMax val="0"/>
+          <dgm:bulletEnabled val="1"/>
+        </dgm:presLayoutVars>
+      </dgm:prSet>
+      <dgm:spPr/>
+      <dgm:t>
+        <a:bodyPr/>
+        <a:lstStyle/>
+        <a:p>
+          <a:endParaRPr lang="de-DE"/>
+        </a:p>
+      </dgm:t>
+    </dgm:pt>
+    <dgm:pt modelId="{8F90648D-A121-4297-8499-3D535FE47FBB}" type="pres">
+      <dgm:prSet presAssocID="{48A04D13-92A0-4866-976A-E14717149447}" presName="childText" presStyleLbl="revTx" presStyleIdx="1" presStyleCnt="2">
         <dgm:presLayoutVars>
           <dgm:bulletEnabled val="1"/>
         </dgm:presLayoutVars>
@@ -2922,13 +3033,19 @@
     </dgm:pt>
   </dgm:ptLst>
   <dgm:cxnLst>
+    <dgm:cxn modelId="{0D5CAB09-61DF-4396-A6DC-B6BAD26B82C0}" type="presOf" srcId="{99A1590F-8B63-43D5-88BE-F2C6CE48541B}" destId="{2D61DBCF-6287-44DA-A275-8F5D8F9FA325}" srcOrd="0" destOrd="0" presId="urn:microsoft.com/office/officeart/2005/8/layout/vList2"/>
+    <dgm:cxn modelId="{AE5089A9-19A5-40EE-95A3-F538D754775B}" srcId="{48A04D13-92A0-4866-976A-E14717149447}" destId="{CF58630A-696F-463E-A327-A6769B809D05}" srcOrd="0" destOrd="0" parTransId="{B0E917E1-06B7-4E6F-99F3-08F4E4F99A34}" sibTransId="{86D204B1-87A6-4D1C-9947-43FBABFD0865}"/>
+    <dgm:cxn modelId="{59E9A8ED-7F7C-400D-8295-C024BFCC1425}" srcId="{9791EE8E-6130-4D6C-B203-8E3C213DCBD4}" destId="{99A1590F-8B63-43D5-88BE-F2C6CE48541B}" srcOrd="0" destOrd="0" parTransId="{F4795E77-E777-4B01-A389-05DE2C6C7BB2}" sibTransId="{02D71DC3-DD13-4634-98A8-6D155C81137F}"/>
+    <dgm:cxn modelId="{DA458791-0D4B-45F1-A023-F890C045530C}" type="presOf" srcId="{48A04D13-92A0-4866-976A-E14717149447}" destId="{C9EDDB65-5233-40CD-A818-7518C4EA98F5}" srcOrd="0" destOrd="0" presId="urn:microsoft.com/office/officeart/2005/8/layout/vList2"/>
+    <dgm:cxn modelId="{A0D4D5D0-FEFE-4AC2-8016-A181BAE14405}" type="presOf" srcId="{CF58630A-696F-463E-A327-A6769B809D05}" destId="{8F90648D-A121-4297-8499-3D535FE47FBB}" srcOrd="0" destOrd="0" presId="urn:microsoft.com/office/officeart/2005/8/layout/vList2"/>
+    <dgm:cxn modelId="{57986A8C-51D6-47F0-BE61-75C6BCAF40BE}" srcId="{99A1590F-8B63-43D5-88BE-F2C6CE48541B}" destId="{4DFA3048-020D-4EEE-9A16-92B1A5E39ADA}" srcOrd="0" destOrd="0" parTransId="{72426658-1255-47DD-BF89-2C91781C6D90}" sibTransId="{3716D55D-97C4-4DA8-B103-F5E482F8EB74}"/>
+    <dgm:cxn modelId="{18DFD051-FCA7-4EBF-A032-31987FE2CAE2}" srcId="{9791EE8E-6130-4D6C-B203-8E3C213DCBD4}" destId="{48A04D13-92A0-4866-976A-E14717149447}" srcOrd="1" destOrd="0" parTransId="{CC338EC9-8727-4AFD-BA29-D73D370A8E84}" sibTransId="{8EAB64D1-E0A9-4455-B8C9-B78E215C21B9}"/>
+    <dgm:cxn modelId="{0CAFF6CF-09EC-470C-961A-B33D44849BA3}" type="presOf" srcId="{4DFA3048-020D-4EEE-9A16-92B1A5E39ADA}" destId="{CBA7FB57-29F7-4941-9259-633B0B64FD75}" srcOrd="0" destOrd="0" presId="urn:microsoft.com/office/officeart/2005/8/layout/vList2"/>
     <dgm:cxn modelId="{7F0320D2-2C6D-4FE8-94E9-B5AF8ACB0F13}" type="presOf" srcId="{9791EE8E-6130-4D6C-B203-8E3C213DCBD4}" destId="{B04E331D-BAFE-426D-B084-CFB8553E2B09}" srcOrd="0" destOrd="0" presId="urn:microsoft.com/office/officeart/2005/8/layout/vList2"/>
-    <dgm:cxn modelId="{59E9A8ED-7F7C-400D-8295-C024BFCC1425}" srcId="{9791EE8E-6130-4D6C-B203-8E3C213DCBD4}" destId="{99A1590F-8B63-43D5-88BE-F2C6CE48541B}" srcOrd="0" destOrd="0" parTransId="{F4795E77-E777-4B01-A389-05DE2C6C7BB2}" sibTransId="{02D71DC3-DD13-4634-98A8-6D155C81137F}"/>
-    <dgm:cxn modelId="{0CAFF6CF-09EC-470C-961A-B33D44849BA3}" type="presOf" srcId="{4DFA3048-020D-4EEE-9A16-92B1A5E39ADA}" destId="{CBA7FB57-29F7-4941-9259-633B0B64FD75}" srcOrd="0" destOrd="0" presId="urn:microsoft.com/office/officeart/2005/8/layout/vList2"/>
-    <dgm:cxn modelId="{57986A8C-51D6-47F0-BE61-75C6BCAF40BE}" srcId="{99A1590F-8B63-43D5-88BE-F2C6CE48541B}" destId="{4DFA3048-020D-4EEE-9A16-92B1A5E39ADA}" srcOrd="0" destOrd="0" parTransId="{72426658-1255-47DD-BF89-2C91781C6D90}" sibTransId="{3716D55D-97C4-4DA8-B103-F5E482F8EB74}"/>
-    <dgm:cxn modelId="{0D5CAB09-61DF-4396-A6DC-B6BAD26B82C0}" type="presOf" srcId="{99A1590F-8B63-43D5-88BE-F2C6CE48541B}" destId="{2D61DBCF-6287-44DA-A275-8F5D8F9FA325}" srcOrd="0" destOrd="0" presId="urn:microsoft.com/office/officeart/2005/8/layout/vList2"/>
     <dgm:cxn modelId="{A1E1EABC-E43C-465A-8EA3-22D29CC8F78C}" type="presParOf" srcId="{B04E331D-BAFE-426D-B084-CFB8553E2B09}" destId="{2D61DBCF-6287-44DA-A275-8F5D8F9FA325}" srcOrd="0" destOrd="0" presId="urn:microsoft.com/office/officeart/2005/8/layout/vList2"/>
     <dgm:cxn modelId="{478061FE-9A79-4AC0-9983-04DF3C063615}" type="presParOf" srcId="{B04E331D-BAFE-426D-B084-CFB8553E2B09}" destId="{CBA7FB57-29F7-4941-9259-633B0B64FD75}" srcOrd="1" destOrd="0" presId="urn:microsoft.com/office/officeart/2005/8/layout/vList2"/>
+    <dgm:cxn modelId="{7E8361CB-2293-42B3-8C96-5F7BFCB5EFEF}" type="presParOf" srcId="{B04E331D-BAFE-426D-B084-CFB8553E2B09}" destId="{C9EDDB65-5233-40CD-A818-7518C4EA98F5}" srcOrd="2" destOrd="0" presId="urn:microsoft.com/office/officeart/2005/8/layout/vList2"/>
+    <dgm:cxn modelId="{8BB10884-38B8-47C3-9FD7-9F50062AD84B}" type="presParOf" srcId="{B04E331D-BAFE-426D-B084-CFB8553E2B09}" destId="{8F90648D-A121-4297-8499-3D535FE47FBB}" srcOrd="3" destOrd="0" presId="urn:microsoft.com/office/officeart/2005/8/layout/vList2"/>
   </dgm:cxnLst>
   <dgm:bg/>
   <dgm:whole/>
@@ -3084,11 +3201,11 @@
     </dgm:pt>
   </dgm:ptLst>
   <dgm:cxnLst>
-    <dgm:cxn modelId="{52CD80B1-899A-4C40-9AED-B9BCC817B914}" type="presOf" srcId="{F8777D79-2153-4A0B-B6EA-DF341FF64042}" destId="{8A2C9C8A-3D81-4BF8-9F70-7144C057E7B4}" srcOrd="0" destOrd="0" presId="urn:microsoft.com/office/officeart/2005/8/layout/vList2"/>
     <dgm:cxn modelId="{59AD06F1-0181-4258-9790-9495C0F2C274}" type="presOf" srcId="{F9A622AC-11AB-4E71-B5D6-899F8975F473}" destId="{FC4ED248-5736-4DB0-B62A-B1EA3BE68CAD}" srcOrd="0" destOrd="0" presId="urn:microsoft.com/office/officeart/2005/8/layout/vList2"/>
     <dgm:cxn modelId="{B1DE6DD9-7AD4-4E82-802B-0FCB30680EC6}" srcId="{F8777D79-2153-4A0B-B6EA-DF341FF64042}" destId="{43C10F21-8A9D-427F-8E0C-3EAA7C87747F}" srcOrd="1" destOrd="0" parTransId="{8BE4A60D-BDEB-492B-8095-537BF0371027}" sibTransId="{BB1E79E9-6223-435B-B8BC-082203700E31}"/>
     <dgm:cxn modelId="{F649422F-9952-4E45-ABFB-AA0C48749BB3}" srcId="{F8777D79-2153-4A0B-B6EA-DF341FF64042}" destId="{F9A622AC-11AB-4E71-B5D6-899F8975F473}" srcOrd="0" destOrd="0" parTransId="{5F3C70D1-2465-4ED3-B135-1CF5BC192727}" sibTransId="{28812FA1-7156-4086-AC5E-1EE7FD4F1135}"/>
     <dgm:cxn modelId="{DA1ECE00-47DA-43E1-91CA-0985E125F2EA}" type="presOf" srcId="{43C10F21-8A9D-427F-8E0C-3EAA7C87747F}" destId="{230EF32B-A071-4821-A72C-4DA891F7AE49}" srcOrd="0" destOrd="0" presId="urn:microsoft.com/office/officeart/2005/8/layout/vList2"/>
+    <dgm:cxn modelId="{52CD80B1-899A-4C40-9AED-B9BCC817B914}" type="presOf" srcId="{F8777D79-2153-4A0B-B6EA-DF341FF64042}" destId="{8A2C9C8A-3D81-4BF8-9F70-7144C057E7B4}" srcOrd="0" destOrd="0" presId="urn:microsoft.com/office/officeart/2005/8/layout/vList2"/>
     <dgm:cxn modelId="{AA8C60EA-2532-4726-8998-57B306DC48B0}" type="presParOf" srcId="{8A2C9C8A-3D81-4BF8-9F70-7144C057E7B4}" destId="{FC4ED248-5736-4DB0-B62A-B1EA3BE68CAD}" srcOrd="0" destOrd="0" presId="urn:microsoft.com/office/officeart/2005/8/layout/vList2"/>
     <dgm:cxn modelId="{3F29DBDB-E751-44C9-AE6C-0EBE8C505E2A}" type="presParOf" srcId="{8A2C9C8A-3D81-4BF8-9F70-7144C057E7B4}" destId="{9C244931-3758-41D3-B275-FF76FCA5A776}" srcOrd="1" destOrd="0" presId="urn:microsoft.com/office/officeart/2005/8/layout/vList2"/>
     <dgm:cxn modelId="{EB12A2E5-4F62-4F92-8F9C-F1D749D7F26C}" type="presParOf" srcId="{8A2C9C8A-3D81-4BF8-9F70-7144C057E7B4}" destId="{230EF32B-A071-4821-A72C-4DA891F7AE49}" srcOrd="2" destOrd="0" presId="urn:microsoft.com/office/officeart/2005/8/layout/vList2"/>
@@ -3625,8 +3742,8 @@
       </dsp:nvSpPr>
       <dsp:spPr>
         <a:xfrm>
-          <a:off x="0" y="540451"/>
-          <a:ext cx="11029615" cy="1521000"/>
+          <a:off x="0" y="160831"/>
+          <a:ext cx="11029615" cy="982799"/>
         </a:xfrm>
         <a:prstGeom prst="roundRect">
           <a:avLst/>
@@ -3667,12 +3784,12 @@
         </a:fontRef>
       </dsp:style>
       <dsp:txBody>
-        <a:bodyPr spcFirstLastPara="0" vert="horz" wrap="square" lIns="247650" tIns="247650" rIns="247650" bIns="247650" numCol="1" spcCol="1270" anchor="ctr" anchorCtr="0">
+        <a:bodyPr spcFirstLastPara="0" vert="horz" wrap="square" lIns="160020" tIns="160020" rIns="160020" bIns="160020" numCol="1" spcCol="1270" anchor="ctr" anchorCtr="0">
           <a:noAutofit/>
         </a:bodyPr>
         <a:lstStyle/>
         <a:p>
-          <a:pPr lvl="0" algn="l" defTabSz="2889250" rtl="0">
+          <a:pPr lvl="0" algn="l" defTabSz="1866900" rtl="0">
             <a:lnSpc>
               <a:spcPct val="90000"/>
             </a:lnSpc>
@@ -3684,15 +3801,15 @@
             </a:spcAft>
           </a:pPr>
           <a:r>
-            <a:rPr lang="de-DE" sz="6500" kern="1200" dirty="0" smtClean="0"/>
+            <a:rPr lang="de-DE" sz="4200" kern="1200" dirty="0" smtClean="0"/>
             <a:t>Monster</a:t>
           </a:r>
-          <a:endParaRPr lang="de-DE" sz="6500" kern="1200" dirty="0"/>
+          <a:endParaRPr lang="de-DE" sz="4200" kern="1200" dirty="0"/>
         </a:p>
       </dsp:txBody>
       <dsp:txXfrm>
-        <a:off x="74249" y="614700"/>
-        <a:ext cx="10881117" cy="1372502"/>
+        <a:off x="47976" y="208807"/>
+        <a:ext cx="10933663" cy="886847"/>
       </dsp:txXfrm>
     </dsp:sp>
     <dsp:sp modelId="{CBA7FB57-29F7-4941-9259-633B0B64FD75}">
@@ -3702,8 +3819,8 @@
       </dsp:nvSpPr>
       <dsp:spPr>
         <a:xfrm>
-          <a:off x="0" y="2061451"/>
-          <a:ext cx="11029615" cy="1076400"/>
+          <a:off x="0" y="1143631"/>
+          <a:ext cx="11029615" cy="695520"/>
         </a:xfrm>
         <a:prstGeom prst="rect">
           <a:avLst/>
@@ -3727,12 +3844,12 @@
         <a:fontRef idx="minor"/>
       </dsp:style>
       <dsp:txBody>
-        <a:bodyPr spcFirstLastPara="0" vert="horz" wrap="square" lIns="350190" tIns="82550" rIns="462280" bIns="82550" numCol="1" spcCol="1270" anchor="t" anchorCtr="0">
+        <a:bodyPr spcFirstLastPara="0" vert="horz" wrap="square" lIns="350190" tIns="53340" rIns="298704" bIns="53340" numCol="1" spcCol="1270" anchor="t" anchorCtr="0">
           <a:noAutofit/>
         </a:bodyPr>
         <a:lstStyle/>
         <a:p>
-          <a:pPr marL="285750" lvl="1" indent="-285750" algn="l" defTabSz="2266950" rtl="0">
+          <a:pPr marL="285750" lvl="1" indent="-285750" algn="l" defTabSz="1466850" rtl="0">
             <a:lnSpc>
               <a:spcPct val="90000"/>
             </a:lnSpc>
@@ -3745,15 +3862,157 @@
             <a:buChar char="••"/>
           </a:pPr>
           <a:r>
-            <a:rPr lang="de-DE" sz="5100" kern="1200" dirty="0" smtClean="0"/>
+            <a:rPr lang="de-DE" sz="3300" kern="1200" dirty="0" smtClean="0"/>
             <a:t>Monster verfolgen und greifen an</a:t>
           </a:r>
-          <a:endParaRPr lang="de-DE" sz="5100" kern="1200" dirty="0"/>
+          <a:endParaRPr lang="de-DE" sz="3300" kern="1200" dirty="0"/>
         </a:p>
       </dsp:txBody>
       <dsp:txXfrm>
-        <a:off x="0" y="2061451"/>
-        <a:ext cx="11029615" cy="1076400"/>
+        <a:off x="0" y="1143631"/>
+        <a:ext cx="11029615" cy="695520"/>
+      </dsp:txXfrm>
+    </dsp:sp>
+    <dsp:sp modelId="{C9EDDB65-5233-40CD-A818-7518C4EA98F5}">
+      <dsp:nvSpPr>
+        <dsp:cNvPr id="0" name=""/>
+        <dsp:cNvSpPr/>
+      </dsp:nvSpPr>
+      <dsp:spPr>
+        <a:xfrm>
+          <a:off x="0" y="1839151"/>
+          <a:ext cx="11029615" cy="982799"/>
+        </a:xfrm>
+        <a:prstGeom prst="roundRect">
+          <a:avLst/>
+        </a:prstGeom>
+        <a:solidFill>
+          <a:schemeClr val="accent1">
+            <a:hueOff val="0"/>
+            <a:satOff val="0"/>
+            <a:lumOff val="0"/>
+            <a:alphaOff val="0"/>
+          </a:schemeClr>
+        </a:solidFill>
+        <a:ln w="22225" cap="rnd" cmpd="sng" algn="ctr">
+          <a:solidFill>
+            <a:schemeClr val="lt1">
+              <a:hueOff val="0"/>
+              <a:satOff val="0"/>
+              <a:lumOff val="0"/>
+              <a:alphaOff val="0"/>
+            </a:schemeClr>
+          </a:solidFill>
+          <a:prstDash val="solid"/>
+        </a:ln>
+        <a:effectLst/>
+      </dsp:spPr>
+      <dsp:style>
+        <a:lnRef idx="2">
+          <a:scrgbClr r="0" g="0" b="0"/>
+        </a:lnRef>
+        <a:fillRef idx="1">
+          <a:scrgbClr r="0" g="0" b="0"/>
+        </a:fillRef>
+        <a:effectRef idx="0">
+          <a:scrgbClr r="0" g="0" b="0"/>
+        </a:effectRef>
+        <a:fontRef idx="minor">
+          <a:schemeClr val="lt1"/>
+        </a:fontRef>
+      </dsp:style>
+      <dsp:txBody>
+        <a:bodyPr spcFirstLastPara="0" vert="horz" wrap="square" lIns="160020" tIns="160020" rIns="160020" bIns="160020" numCol="1" spcCol="1270" anchor="ctr" anchorCtr="0">
+          <a:noAutofit/>
+        </a:bodyPr>
+        <a:lstStyle/>
+        <a:p>
+          <a:pPr lvl="0" algn="l" defTabSz="1866900" rtl="0">
+            <a:lnSpc>
+              <a:spcPct val="90000"/>
+            </a:lnSpc>
+            <a:spcBef>
+              <a:spcPct val="0"/>
+            </a:spcBef>
+            <a:spcAft>
+              <a:spcPct val="35000"/>
+            </a:spcAft>
+          </a:pPr>
+          <a:r>
+            <a:rPr lang="de-DE" sz="4200" kern="1200" dirty="0" err="1" smtClean="0"/>
+            <a:t>Balancing</a:t>
+          </a:r>
+          <a:endParaRPr lang="de-DE" sz="4200" kern="1200" dirty="0"/>
+        </a:p>
+      </dsp:txBody>
+      <dsp:txXfrm>
+        <a:off x="47976" y="1887127"/>
+        <a:ext cx="10933663" cy="886847"/>
+      </dsp:txXfrm>
+    </dsp:sp>
+    <dsp:sp modelId="{8F90648D-A121-4297-8499-3D535FE47FBB}">
+      <dsp:nvSpPr>
+        <dsp:cNvPr id="0" name=""/>
+        <dsp:cNvSpPr/>
+      </dsp:nvSpPr>
+      <dsp:spPr>
+        <a:xfrm>
+          <a:off x="0" y="2821951"/>
+          <a:ext cx="11029615" cy="695520"/>
+        </a:xfrm>
+        <a:prstGeom prst="rect">
+          <a:avLst/>
+        </a:prstGeom>
+        <a:noFill/>
+        <a:ln>
+          <a:noFill/>
+        </a:ln>
+        <a:effectLst/>
+      </dsp:spPr>
+      <dsp:style>
+        <a:lnRef idx="0">
+          <a:scrgbClr r="0" g="0" b="0"/>
+        </a:lnRef>
+        <a:fillRef idx="0">
+          <a:scrgbClr r="0" g="0" b="0"/>
+        </a:fillRef>
+        <a:effectRef idx="0">
+          <a:scrgbClr r="0" g="0" b="0"/>
+        </a:effectRef>
+        <a:fontRef idx="minor"/>
+      </dsp:style>
+      <dsp:txBody>
+        <a:bodyPr spcFirstLastPara="0" vert="horz" wrap="square" lIns="350190" tIns="53340" rIns="298704" bIns="53340" numCol="1" spcCol="1270" anchor="t" anchorCtr="0">
+          <a:noAutofit/>
+        </a:bodyPr>
+        <a:lstStyle/>
+        <a:p>
+          <a:pPr marL="285750" lvl="1" indent="-285750" algn="l" defTabSz="1466850" rtl="0">
+            <a:lnSpc>
+              <a:spcPct val="90000"/>
+            </a:lnSpc>
+            <a:spcBef>
+              <a:spcPct val="0"/>
+            </a:spcBef>
+            <a:spcAft>
+              <a:spcPct val="20000"/>
+            </a:spcAft>
+            <a:buChar char="••"/>
+          </a:pPr>
+          <a:r>
+            <a:rPr lang="de-DE" sz="3300" kern="1200" dirty="0" err="1" smtClean="0"/>
+            <a:t>Balancing</a:t>
+          </a:r>
+          <a:r>
+            <a:rPr lang="de-DE" sz="3300" kern="1200" dirty="0" smtClean="0"/>
+            <a:t> zwischen Spieler und Monstern wurde optimiert</a:t>
+          </a:r>
+          <a:endParaRPr lang="de-DE" sz="3300" kern="1200" dirty="0"/>
+        </a:p>
+      </dsp:txBody>
+      <dsp:txXfrm>
+        <a:off x="0" y="2821951"/>
+        <a:ext cx="11029615" cy="695520"/>
       </dsp:txXfrm>
     </dsp:sp>
   </dsp:spTree>
@@ -11770,11 +12029,7 @@
             </a:r>
             <a:r>
               <a:rPr lang="de-DE" dirty="0" smtClean="0"/>
-              <a:t>: </a:t>
-            </a:r>
-            <a:r>
-              <a:rPr lang="de-DE" dirty="0" smtClean="0"/>
-              <a:t>Endpräsentation</a:t>
+              <a:t>: Endpräsentation</a:t>
             </a:r>
             <a:endParaRPr lang="de-DE" dirty="0"/>
           </a:p>
@@ -11910,21 +12165,13 @@
           <a:p>
             <a:r>
               <a:rPr lang="de-DE" dirty="0" smtClean="0"/>
-              <a:t>Welche </a:t>
+              <a:t>Welche Features sind neu?</a:t>
             </a:r>
+          </a:p>
+          <a:p>
             <a:r>
               <a:rPr lang="de-DE" dirty="0" smtClean="0"/>
-              <a:t>Features sind neu?</a:t>
-            </a:r>
-          </a:p>
-          <a:p>
-            <a:r>
-              <a:rPr lang="de-DE" dirty="0" smtClean="0"/>
-              <a:t>Was </a:t>
-            </a:r>
-            <a:r>
-              <a:rPr lang="de-DE" dirty="0" smtClean="0"/>
-              <a:t>ist in Zukunft denkbar? Was haben wir nicht geschafft?</a:t>
+              <a:t>Was ist in Zukunft denkbar? Was haben wir nicht geschafft?</a:t>
             </a:r>
             <a:endParaRPr lang="de-DE" dirty="0"/>
           </a:p>
@@ -12308,7 +12555,7 @@
             <p:ph idx="1"/>
             <p:extLst>
               <p:ext uri="{D42A27DB-BD31-4B8C-83A1-F6EECF244321}">
-                <p14:modId xmlns:p14="http://schemas.microsoft.com/office/powerpoint/2010/main" val="761171761"/>
+                <p14:modId xmlns:p14="http://schemas.microsoft.com/office/powerpoint/2010/main" val="3042146847"/>
               </p:ext>
             </p:extLst>
           </p:nvPr>
@@ -12401,11 +12648,7 @@
           <a:p>
             <a:r>
               <a:rPr lang="de-DE" dirty="0" smtClean="0"/>
-              <a:t>Was </a:t>
-            </a:r>
-            <a:r>
-              <a:rPr lang="de-DE" dirty="0" smtClean="0"/>
-              <a:t>ist in Zukunft denkbar? Was haben wir nicht geschafft?</a:t>
+              <a:t>Was ist in Zukunft denkbar? Was haben wir nicht geschafft?</a:t>
             </a:r>
             <a:endParaRPr lang="de-DE" dirty="0"/>
           </a:p>

</xml_diff>